<commit_message>
upload code and data to github
</commit_message>
<xml_diff>
--- a/Draft/ICSE'18/BugPatchingRanking.pptx
+++ b/Draft/ICSE'18/BugPatchingRanking.pptx
@@ -26842,16 +26842,25 @@
           <a:prstGeom prst="line">
             <a:avLst/>
           </a:prstGeom>
+          <a:ln w="9525" cap="flat" cmpd="sng" algn="ctr">
+            <a:solidFill>
+              <a:schemeClr val="accent1"/>
+            </a:solidFill>
+            <a:prstDash val="dash"/>
+            <a:round/>
+            <a:headEnd type="none" w="med" len="med"/>
+            <a:tailEnd type="none" w="med" len="med"/>
+          </a:ln>
         </p:spPr>
         <p:style>
-          <a:lnRef idx="1">
-            <a:schemeClr val="accent1"/>
+          <a:lnRef idx="0">
+            <a:scrgbClr r="0" g="0" b="0"/>
           </a:lnRef>
           <a:fillRef idx="0">
-            <a:schemeClr val="accent1"/>
+            <a:scrgbClr r="0" g="0" b="0"/>
           </a:fillRef>
           <a:effectRef idx="0">
-            <a:schemeClr val="accent1"/>
+            <a:scrgbClr r="0" g="0" b="0"/>
           </a:effectRef>
           <a:fontRef idx="minor">
             <a:schemeClr val="tx1"/>
@@ -26907,16 +26916,25 @@
           <a:prstGeom prst="line">
             <a:avLst/>
           </a:prstGeom>
+          <a:ln w="9525" cap="flat" cmpd="sng" algn="ctr">
+            <a:solidFill>
+              <a:schemeClr val="accent1"/>
+            </a:solidFill>
+            <a:prstDash val="dash"/>
+            <a:round/>
+            <a:headEnd type="none" w="med" len="med"/>
+            <a:tailEnd type="none" w="med" len="med"/>
+          </a:ln>
         </p:spPr>
         <p:style>
-          <a:lnRef idx="1">
-            <a:schemeClr val="accent1"/>
+          <a:lnRef idx="0">
+            <a:scrgbClr r="0" g="0" b="0"/>
           </a:lnRef>
           <a:fillRef idx="0">
-            <a:schemeClr val="accent1"/>
+            <a:scrgbClr r="0" g="0" b="0"/>
           </a:fillRef>
           <a:effectRef idx="0">
-            <a:schemeClr val="accent1"/>
+            <a:scrgbClr r="0" g="0" b="0"/>
           </a:effectRef>
           <a:fontRef idx="minor">
             <a:schemeClr val="tx1"/>
@@ -29422,16 +29440,25 @@
           <a:prstGeom prst="line">
             <a:avLst/>
           </a:prstGeom>
+          <a:ln w="9525" cap="flat" cmpd="sng" algn="ctr">
+            <a:solidFill>
+              <a:schemeClr val="accent1"/>
+            </a:solidFill>
+            <a:prstDash val="dash"/>
+            <a:round/>
+            <a:headEnd type="none" w="med" len="med"/>
+            <a:tailEnd type="none" w="med" len="med"/>
+          </a:ln>
         </p:spPr>
         <p:style>
-          <a:lnRef idx="1">
-            <a:schemeClr val="accent1"/>
+          <a:lnRef idx="0">
+            <a:scrgbClr r="0" g="0" b="0"/>
           </a:lnRef>
           <a:fillRef idx="0">
-            <a:schemeClr val="accent1"/>
+            <a:scrgbClr r="0" g="0" b="0"/>
           </a:fillRef>
           <a:effectRef idx="0">
-            <a:schemeClr val="accent1"/>
+            <a:scrgbClr r="0" g="0" b="0"/>
           </a:effectRef>
           <a:fontRef idx="minor">
             <a:schemeClr val="tx1"/>
@@ -29487,16 +29514,25 @@
           <a:prstGeom prst="line">
             <a:avLst/>
           </a:prstGeom>
+          <a:ln w="9525" cap="flat" cmpd="sng" algn="ctr">
+            <a:solidFill>
+              <a:schemeClr val="accent1"/>
+            </a:solidFill>
+            <a:prstDash val="dash"/>
+            <a:round/>
+            <a:headEnd type="none" w="med" len="med"/>
+            <a:tailEnd type="none" w="med" len="med"/>
+          </a:ln>
         </p:spPr>
         <p:style>
-          <a:lnRef idx="1">
-            <a:schemeClr val="accent1"/>
+          <a:lnRef idx="0">
+            <a:scrgbClr r="0" g="0" b="0"/>
           </a:lnRef>
           <a:fillRef idx="0">
-            <a:schemeClr val="accent1"/>
+            <a:scrgbClr r="0" g="0" b="0"/>
           </a:fillRef>
           <a:effectRef idx="0">
-            <a:schemeClr val="accent1"/>
+            <a:scrgbClr r="0" g="0" b="0"/>
           </a:effectRef>
           <a:fontRef idx="minor">
             <a:schemeClr val="tx1"/>
@@ -30244,20 +30280,25 @@
           <a:prstGeom prst="line">
             <a:avLst/>
           </a:prstGeom>
-          <a:ln>
+          <a:ln w="9525" cap="flat" cmpd="sng" algn="ctr">
+            <a:solidFill>
+              <a:schemeClr val="accent3"/>
+            </a:solidFill>
+            <a:prstDash val="dash"/>
+            <a:round/>
             <a:headEnd type="none" w="med" len="med"/>
             <a:tailEnd type="none" w="med" len="med"/>
           </a:ln>
         </p:spPr>
         <p:style>
-          <a:lnRef idx="1">
-            <a:schemeClr val="accent3"/>
+          <a:lnRef idx="0">
+            <a:scrgbClr r="0" g="0" b="0"/>
           </a:lnRef>
           <a:fillRef idx="0">
-            <a:schemeClr val="accent3"/>
+            <a:scrgbClr r="0" g="0" b="0"/>
           </a:fillRef>
           <a:effectRef idx="0">
-            <a:schemeClr val="accent3"/>
+            <a:scrgbClr r="0" g="0" b="0"/>
           </a:effectRef>
           <a:fontRef idx="minor">
             <a:schemeClr val="tx1"/>
@@ -30278,20 +30319,25 @@
           <a:prstGeom prst="line">
             <a:avLst/>
           </a:prstGeom>
-          <a:ln>
+          <a:ln w="9525" cap="flat" cmpd="sng" algn="ctr">
+            <a:solidFill>
+              <a:schemeClr val="accent3"/>
+            </a:solidFill>
+            <a:prstDash val="dash"/>
+            <a:round/>
             <a:headEnd type="none" w="med" len="med"/>
             <a:tailEnd type="none" w="med" len="med"/>
           </a:ln>
         </p:spPr>
         <p:style>
-          <a:lnRef idx="1">
-            <a:schemeClr val="accent3"/>
+          <a:lnRef idx="0">
+            <a:scrgbClr r="0" g="0" b="0"/>
           </a:lnRef>
           <a:fillRef idx="0">
-            <a:schemeClr val="accent3"/>
+            <a:scrgbClr r="0" g="0" b="0"/>
           </a:fillRef>
           <a:effectRef idx="0">
-            <a:schemeClr val="accent3"/>
+            <a:scrgbClr r="0" g="0" b="0"/>
           </a:effectRef>
           <a:fontRef idx="minor">
             <a:schemeClr val="tx1"/>

</xml_diff>